<commit_message>
update to Az PowerShell slide
</commit_message>
<xml_diff>
--- a/ExpertsLiveIN2019/AzureAtTheCommandLine-Ravikanth.pptx
+++ b/ExpertsLiveIN2019/AzureAtTheCommandLine-Ravikanth.pptx
@@ -258,7 +258,7 @@
           <a:p>
             <a:fld id="{3E82F302-A7C8-034E-97BB-FC8263E03487}" type="datetimeFigureOut">
               <a:rPr lang="en-US" smtClean="0"/>
-              <a:t>1/15/2019</a:t>
+              <a:t>1/17/2019</a:t>
             </a:fld>
             <a:endParaRPr lang="en-US"/>
           </a:p>
@@ -423,7 +423,7 @@
           <a:p>
             <a:fld id="{572B889E-FB6B-4D81-8FCC-1555F636B1A5}" type="datetimeFigureOut">
               <a:rPr lang="x-none" smtClean="0"/>
-              <a:t>1/15/2019</a:t>
+              <a:t>1/17/2019</a:t>
             </a:fld>
             <a:endParaRPr lang="x-none"/>
           </a:p>
@@ -2441,7 +2441,7 @@
                 <a:hlinkClick r:id="rId2">
                   <a:extLst>
                     <a:ext uri="{A12FA001-AC4F-418D-AE19-62706E023703}">
-                      <ahyp:hlinkClr xmlns:ahyp="http://schemas.microsoft.com/office/drawing/2018/hyperlinkcolor" xmlns="" val="tx"/>
+                      <ahyp:hlinkClr xmlns="" xmlns:ahyp="http://schemas.microsoft.com/office/drawing/2018/hyperlinkcolor" val="tx"/>
                     </a:ext>
                   </a:extLst>
                 </a:hlinkClick>
@@ -2479,7 +2479,7 @@
                 <a:hlinkClick r:id="rId3">
                   <a:extLst>
                     <a:ext uri="{A12FA001-AC4F-418D-AE19-62706E023703}">
-                      <ahyp:hlinkClr xmlns:ahyp="http://schemas.microsoft.com/office/drawing/2018/hyperlinkcolor" xmlns="" val="tx"/>
+                      <ahyp:hlinkClr xmlns="" xmlns:ahyp="http://schemas.microsoft.com/office/drawing/2018/hyperlinkcolor" val="tx"/>
                     </a:ext>
                   </a:extLst>
                 </a:hlinkClick>
@@ -2516,7 +2516,7 @@
                 <a:hlinkClick r:id="rId4">
                   <a:extLst>
                     <a:ext uri="{A12FA001-AC4F-418D-AE19-62706E023703}">
-                      <ahyp:hlinkClr xmlns:ahyp="http://schemas.microsoft.com/office/drawing/2018/hyperlinkcolor" xmlns="" val="tx"/>
+                      <ahyp:hlinkClr xmlns="" xmlns:ahyp="http://schemas.microsoft.com/office/drawing/2018/hyperlinkcolor" val="tx"/>
                     </a:ext>
                   </a:extLst>
                 </a:hlinkClick>
@@ -2554,7 +2554,7 @@
                 <a:hlinkClick r:id="rId5">
                   <a:extLst>
                     <a:ext uri="{A12FA001-AC4F-418D-AE19-62706E023703}">
-                      <ahyp:hlinkClr xmlns:ahyp="http://schemas.microsoft.com/office/drawing/2018/hyperlinkcolor" xmlns="" val="tx"/>
+                      <ahyp:hlinkClr xmlns="" xmlns:ahyp="http://schemas.microsoft.com/office/drawing/2018/hyperlinkcolor" val="tx"/>
                     </a:ext>
                   </a:extLst>
                 </a:hlinkClick>
@@ -5542,16 +5542,24 @@
         <p:spPr/>
         <p:txBody>
           <a:bodyPr>
-            <a:normAutofit lnSpcReduction="10000"/>
+            <a:normAutofit fontScale="92500"/>
           </a:bodyPr>
           <a:lstStyle/>
           <a:p>
             <a:r>
               <a:rPr lang="en-US" dirty="0"/>
-              <a:t>Current version is 1.0.0</a:t>
-            </a:r>
-          </a:p>
-          <a:p>
+              <a:t>Current version is 1.1.0</a:t>
+            </a:r>
+          </a:p>
+          <a:p>
+            <a:pPr lvl="1"/>
+            <a:r>
+              <a:rPr lang="en-US" dirty="0"/>
+              <a:t>Requires .NET 4.7.2</a:t>
+            </a:r>
+          </a:p>
+          <a:p>
+            <a:pPr lvl="1"/>
             <a:r>
               <a:rPr lang="en-US" dirty="0"/>
               <a:t>A rollup module</a:t>
@@ -5560,13 +5568,8 @@
           <a:p>
             <a:r>
               <a:rPr lang="en-US" dirty="0"/>
-              <a:t>No interactive experience like Az </a:t>
-            </a:r>
-            <a:r>
-              <a:rPr lang="en-US" dirty="0" err="1"/>
-              <a:t>Cli</a:t>
-            </a:r>
-            <a:endParaRPr lang="en-US" dirty="0"/>
+              <a:t>No interactive experience like Az Cli</a:t>
+            </a:r>
           </a:p>
           <a:p>
             <a:r>
@@ -6569,6 +6572,21 @@
 </file>
 
 <file path=customXml/item1.xml><?xml version="1.0" encoding="utf-8"?>
+<p:properties xmlns:p="http://schemas.microsoft.com/office/2006/metadata/properties" xmlns:xsi="http://www.w3.org/2001/XMLSchema-instance" xmlns:pc="http://schemas.microsoft.com/office/infopath/2007/PartnerControls">
+  <documentManagement/>
+</p:properties>
+</file>
+
+<file path=customXml/item2.xml><?xml version="1.0" encoding="utf-8"?>
+<?mso-contentType ?>
+<FormTemplates xmlns="http://schemas.microsoft.com/sharepoint/v3/contenttype/forms">
+  <Display>DocumentLibraryForm</Display>
+  <Edit>DocumentLibraryForm</Edit>
+  <New>DocumentLibraryForm</New>
+</FormTemplates>
+</file>
+
+<file path=customXml/item3.xml><?xml version="1.0" encoding="utf-8"?>
 <ct:contentTypeSchema xmlns:ct="http://schemas.microsoft.com/office/2006/metadata/contentType" xmlns:ma="http://schemas.microsoft.com/office/2006/metadata/properties/metaAttributes" ct:_="" ma:_="" ma:contentTypeName="Dokument" ma:contentTypeID="0x0101001953E0CDE6A38E419236C03EEB01435C" ma:contentTypeVersion="7" ma:contentTypeDescription="Ein neues Dokument erstellen." ma:contentTypeScope="" ma:versionID="35377ed61abc787e6d78f6dd36362cda">
   <xsd:schema xmlns:xsd="http://www.w3.org/2001/XMLSchema" xmlns:xs="http://www.w3.org/2001/XMLSchema" xmlns:p="http://schemas.microsoft.com/office/2006/metadata/properties" xmlns:ns2="74098b8b-3ead-4c65-9f72-d36b5831b20e" xmlns:ns3="c25f9c22-fc1f-4454-8c46-2969b0535af5" targetNamespace="http://schemas.microsoft.com/office/2006/metadata/properties" ma:root="true" ma:fieldsID="77ed309eff22ef73c9fccc7a3e12d61f" ns2:_="" ns3:_="">
     <xsd:import namespace="74098b8b-3ead-4c65-9f72-d36b5831b20e"/>
@@ -6751,22 +6769,32 @@
 </ct:contentTypeSchema>
 </file>
 
-<file path=customXml/item2.xml><?xml version="1.0" encoding="utf-8"?>
-<?mso-contentType ?>
-<FormTemplates xmlns="http://schemas.microsoft.com/sharepoint/v3/contenttype/forms">
-  <Display>DocumentLibraryForm</Display>
-  <Edit>DocumentLibraryForm</Edit>
-  <New>DocumentLibraryForm</New>
-</FormTemplates>
+<file path=customXml/itemProps1.xml><?xml version="1.0" encoding="utf-8"?>
+<ds:datastoreItem xmlns:ds="http://schemas.openxmlformats.org/officeDocument/2006/customXml" ds:itemID="{89296970-E637-471F-86E2-950D4519AEC4}">
+  <ds:schemaRefs>
+    <ds:schemaRef ds:uri="http://schemas.microsoft.com/office/2006/documentManagement/types"/>
+    <ds:schemaRef ds:uri="http://purl.org/dc/terms/"/>
+    <ds:schemaRef ds:uri="http://schemas.microsoft.com/office/2006/metadata/properties"/>
+    <ds:schemaRef ds:uri="http://www.w3.org/XML/1998/namespace"/>
+    <ds:schemaRef ds:uri="http://purl.org/dc/dcmitype/"/>
+    <ds:schemaRef ds:uri="http://purl.org/dc/elements/1.1/"/>
+    <ds:schemaRef ds:uri="http://schemas.microsoft.com/office/infopath/2007/PartnerControls"/>
+    <ds:schemaRef ds:uri="http://schemas.openxmlformats.org/package/2006/metadata/core-properties"/>
+    <ds:schemaRef ds:uri="c25f9c22-fc1f-4454-8c46-2969b0535af5"/>
+    <ds:schemaRef ds:uri="74098b8b-3ead-4c65-9f72-d36b5831b20e"/>
+  </ds:schemaRefs>
+</ds:datastoreItem>
 </file>
 
-<file path=customXml/item3.xml><?xml version="1.0" encoding="utf-8"?>
-<p:properties xmlns:p="http://schemas.microsoft.com/office/2006/metadata/properties" xmlns:xsi="http://www.w3.org/2001/XMLSchema-instance" xmlns:pc="http://schemas.microsoft.com/office/infopath/2007/PartnerControls">
-  <documentManagement/>
-</p:properties>
+<file path=customXml/itemProps2.xml><?xml version="1.0" encoding="utf-8"?>
+<ds:datastoreItem xmlns:ds="http://schemas.openxmlformats.org/officeDocument/2006/customXml" ds:itemID="{D6CE178E-7963-4EFA-83EF-8E123369E092}">
+  <ds:schemaRefs>
+    <ds:schemaRef ds:uri="http://schemas.microsoft.com/sharepoint/v3/contenttype/forms"/>
+  </ds:schemaRefs>
+</ds:datastoreItem>
 </file>
 
-<file path=customXml/itemProps1.xml><?xml version="1.0" encoding="utf-8"?>
+<file path=customXml/itemProps3.xml><?xml version="1.0" encoding="utf-8"?>
 <ds:datastoreItem xmlns:ds="http://schemas.openxmlformats.org/officeDocument/2006/customXml" ds:itemID="{26056780-E2CD-484B-90C1-F30A19D8A5D9}">
   <ds:schemaRefs>
     <ds:schemaRef ds:uri="http://schemas.microsoft.com/office/2006/metadata/contentType"/>
@@ -6783,29 +6811,4 @@
     <ds:schemaRef ds:uri="http://schemas.microsoft.com/internal/obd"/>
   </ds:schemaRefs>
 </ds:datastoreItem>
-</file>
-
-<file path=customXml/itemProps2.xml><?xml version="1.0" encoding="utf-8"?>
-<ds:datastoreItem xmlns:ds="http://schemas.openxmlformats.org/officeDocument/2006/customXml" ds:itemID="{D6CE178E-7963-4EFA-83EF-8E123369E092}">
-  <ds:schemaRefs>
-    <ds:schemaRef ds:uri="http://schemas.microsoft.com/sharepoint/v3/contenttype/forms"/>
-  </ds:schemaRefs>
-</ds:datastoreItem>
-</file>
-
-<file path=customXml/itemProps3.xml><?xml version="1.0" encoding="utf-8"?>
-<ds:datastoreItem xmlns:ds="http://schemas.openxmlformats.org/officeDocument/2006/customXml" ds:itemID="{89296970-E637-471F-86E2-950D4519AEC4}">
-  <ds:schemaRefs>
-    <ds:schemaRef ds:uri="http://schemas.microsoft.com/office/2006/documentManagement/types"/>
-    <ds:schemaRef ds:uri="http://purl.org/dc/terms/"/>
-    <ds:schemaRef ds:uri="http://schemas.microsoft.com/office/2006/metadata/properties"/>
-    <ds:schemaRef ds:uri="http://www.w3.org/XML/1998/namespace"/>
-    <ds:schemaRef ds:uri="http://purl.org/dc/dcmitype/"/>
-    <ds:schemaRef ds:uri="http://purl.org/dc/elements/1.1/"/>
-    <ds:schemaRef ds:uri="http://schemas.microsoft.com/office/infopath/2007/PartnerControls"/>
-    <ds:schemaRef ds:uri="http://schemas.openxmlformats.org/package/2006/metadata/core-properties"/>
-    <ds:schemaRef ds:uri="c25f9c22-fc1f-4454-8c46-2969b0535af5"/>
-    <ds:schemaRef ds:uri="74098b8b-3ead-4c65-9f72-d36b5831b20e"/>
-  </ds:schemaRefs>
-</ds:datastoreItem>
 </file>
</xml_diff>

<commit_message>
updates to shell script
</commit_message>
<xml_diff>
--- a/ExpertsLiveIN2019/AzureAtTheCommandLine-Ravikanth.pptx
+++ b/ExpertsLiveIN2019/AzureAtTheCommandLine-Ravikanth.pptx
@@ -258,7 +258,7 @@
           <a:p>
             <a:fld id="{3E82F302-A7C8-034E-97BB-FC8263E03487}" type="datetimeFigureOut">
               <a:rPr lang="en-US" smtClean="0"/>
-              <a:t>1/15/2019</a:t>
+              <a:t>1/18/2019</a:t>
             </a:fld>
             <a:endParaRPr lang="en-US"/>
           </a:p>
@@ -423,7 +423,7 @@
           <a:p>
             <a:fld id="{572B889E-FB6B-4D81-8FCC-1555F636B1A5}" type="datetimeFigureOut">
               <a:rPr lang="x-none" smtClean="0"/>
-              <a:t>1/15/2019</a:t>
+              <a:t>1/18/2019</a:t>
             </a:fld>
             <a:endParaRPr lang="x-none"/>
           </a:p>
@@ -1087,6 +1087,90 @@
 </file>
 
 <file path=ppt/notesSlides/notesSlide5.xml><?xml version="1.0" encoding="utf-8"?>
+<p:notes xmlns:a="http://schemas.openxmlformats.org/drawingml/2006/main" xmlns:r="http://schemas.openxmlformats.org/officeDocument/2006/relationships" xmlns:p="http://schemas.openxmlformats.org/presentationml/2006/main">
+  <p:cSld>
+    <p:spTree>
+      <p:nvGrpSpPr>
+        <p:cNvPr id="1" name=""/>
+        <p:cNvGrpSpPr/>
+        <p:nvPr/>
+      </p:nvGrpSpPr>
+      <p:grpSpPr>
+        <a:xfrm>
+          <a:off x="0" y="0"/>
+          <a:ext cx="0" cy="0"/>
+          <a:chOff x="0" y="0"/>
+          <a:chExt cx="0" cy="0"/>
+        </a:xfrm>
+      </p:grpSpPr>
+      <p:sp>
+        <p:nvSpPr>
+          <p:cNvPr id="2" name="Slide Image Placeholder 1"/>
+          <p:cNvSpPr>
+            <a:spLocks noGrp="1" noRot="1" noChangeAspect="1"/>
+          </p:cNvSpPr>
+          <p:nvPr>
+            <p:ph type="sldImg"/>
+          </p:nvPr>
+        </p:nvSpPr>
+        <p:spPr/>
+      </p:sp>
+      <p:sp>
+        <p:nvSpPr>
+          <p:cNvPr id="3" name="Notes Placeholder 2"/>
+          <p:cNvSpPr>
+            <a:spLocks noGrp="1"/>
+          </p:cNvSpPr>
+          <p:nvPr>
+            <p:ph type="body" idx="1"/>
+          </p:nvPr>
+        </p:nvSpPr>
+        <p:spPr/>
+        <p:txBody>
+          <a:bodyPr/>
+          <a:lstStyle/>
+          <a:p>
+            <a:endParaRPr lang="en-IN" dirty="0"/>
+          </a:p>
+        </p:txBody>
+      </p:sp>
+      <p:sp>
+        <p:nvSpPr>
+          <p:cNvPr id="4" name="Slide Number Placeholder 3"/>
+          <p:cNvSpPr>
+            <a:spLocks noGrp="1"/>
+          </p:cNvSpPr>
+          <p:nvPr>
+            <p:ph type="sldNum" sz="quarter" idx="5"/>
+          </p:nvPr>
+        </p:nvSpPr>
+        <p:spPr/>
+        <p:txBody>
+          <a:bodyPr/>
+          <a:lstStyle/>
+          <a:p>
+            <a:fld id="{87D14CCA-F323-4048-B6FE-F8FEE77E6C44}" type="slidenum">
+              <a:rPr lang="x-none" smtClean="0"/>
+              <a:t>8</a:t>
+            </a:fld>
+            <a:endParaRPr lang="x-none"/>
+          </a:p>
+        </p:txBody>
+      </p:sp>
+    </p:spTree>
+    <p:extLst>
+      <p:ext uri="{BB962C8B-B14F-4D97-AF65-F5344CB8AC3E}">
+        <p14:creationId xmlns:p14="http://schemas.microsoft.com/office/powerpoint/2010/main" val="1156979216"/>
+      </p:ext>
+    </p:extLst>
+  </p:cSld>
+  <p:clrMapOvr>
+    <a:masterClrMapping/>
+  </p:clrMapOvr>
+</p:notes>
+</file>
+
+<file path=ppt/notesSlides/notesSlide6.xml><?xml version="1.0" encoding="utf-8"?>
 <p:notes xmlns:a="http://schemas.openxmlformats.org/drawingml/2006/main" xmlns:r="http://schemas.openxmlformats.org/officeDocument/2006/relationships" xmlns:p="http://schemas.openxmlformats.org/presentationml/2006/main">
   <p:cSld>
     <p:spTree>
@@ -2441,7 +2525,7 @@
                 <a:hlinkClick r:id="rId2">
                   <a:extLst>
                     <a:ext uri="{A12FA001-AC4F-418D-AE19-62706E023703}">
-                      <ahyp:hlinkClr xmlns:ahyp="http://schemas.microsoft.com/office/drawing/2018/hyperlinkcolor" xmlns="" val="tx"/>
+                      <ahyp:hlinkClr xmlns:ahyp="http://schemas.microsoft.com/office/drawing/2018/hyperlinkcolor" val="tx"/>
                     </a:ext>
                   </a:extLst>
                 </a:hlinkClick>
@@ -2479,7 +2563,7 @@
                 <a:hlinkClick r:id="rId3">
                   <a:extLst>
                     <a:ext uri="{A12FA001-AC4F-418D-AE19-62706E023703}">
-                      <ahyp:hlinkClr xmlns:ahyp="http://schemas.microsoft.com/office/drawing/2018/hyperlinkcolor" xmlns="" val="tx"/>
+                      <ahyp:hlinkClr xmlns:ahyp="http://schemas.microsoft.com/office/drawing/2018/hyperlinkcolor" val="tx"/>
                     </a:ext>
                   </a:extLst>
                 </a:hlinkClick>
@@ -2516,7 +2600,7 @@
                 <a:hlinkClick r:id="rId4">
                   <a:extLst>
                     <a:ext uri="{A12FA001-AC4F-418D-AE19-62706E023703}">
-                      <ahyp:hlinkClr xmlns:ahyp="http://schemas.microsoft.com/office/drawing/2018/hyperlinkcolor" xmlns="" val="tx"/>
+                      <ahyp:hlinkClr xmlns:ahyp="http://schemas.microsoft.com/office/drawing/2018/hyperlinkcolor" val="tx"/>
                     </a:ext>
                   </a:extLst>
                 </a:hlinkClick>
@@ -2554,7 +2638,7 @@
                 <a:hlinkClick r:id="rId5">
                   <a:extLst>
                     <a:ext uri="{A12FA001-AC4F-418D-AE19-62706E023703}">
-                      <ahyp:hlinkClr xmlns:ahyp="http://schemas.microsoft.com/office/drawing/2018/hyperlinkcolor" xmlns="" val="tx"/>
+                      <ahyp:hlinkClr xmlns:ahyp="http://schemas.microsoft.com/office/drawing/2018/hyperlinkcolor" val="tx"/>
                     </a:ext>
                   </a:extLst>
                 </a:hlinkClick>
@@ -5548,8 +5632,13 @@
           <a:p>
             <a:r>
               <a:rPr lang="en-US" dirty="0"/>
-              <a:t>Current version is 1.0.0</a:t>
-            </a:r>
+              <a:t>Current version </a:t>
+            </a:r>
+            <a:r>
+              <a:rPr lang="en-US"/>
+              <a:t>is 1.0.0</a:t>
+            </a:r>
+            <a:endParaRPr lang="en-US" dirty="0"/>
           </a:p>
           <a:p>
             <a:r>
@@ -6569,6 +6658,21 @@
 </file>
 
 <file path=customXml/item1.xml><?xml version="1.0" encoding="utf-8"?>
+<p:properties xmlns:p="http://schemas.microsoft.com/office/2006/metadata/properties" xmlns:xsi="http://www.w3.org/2001/XMLSchema-instance" xmlns:pc="http://schemas.microsoft.com/office/infopath/2007/PartnerControls">
+  <documentManagement/>
+</p:properties>
+</file>
+
+<file path=customXml/item2.xml><?xml version="1.0" encoding="utf-8"?>
+<?mso-contentType ?>
+<FormTemplates xmlns="http://schemas.microsoft.com/sharepoint/v3/contenttype/forms">
+  <Display>DocumentLibraryForm</Display>
+  <Edit>DocumentLibraryForm</Edit>
+  <New>DocumentLibraryForm</New>
+</FormTemplates>
+</file>
+
+<file path=customXml/item3.xml><?xml version="1.0" encoding="utf-8"?>
 <ct:contentTypeSchema xmlns:ct="http://schemas.microsoft.com/office/2006/metadata/contentType" xmlns:ma="http://schemas.microsoft.com/office/2006/metadata/properties/metaAttributes" ct:_="" ma:_="" ma:contentTypeName="Dokument" ma:contentTypeID="0x0101001953E0CDE6A38E419236C03EEB01435C" ma:contentTypeVersion="7" ma:contentTypeDescription="Ein neues Dokument erstellen." ma:contentTypeScope="" ma:versionID="35377ed61abc787e6d78f6dd36362cda">
   <xsd:schema xmlns:xsd="http://www.w3.org/2001/XMLSchema" xmlns:xs="http://www.w3.org/2001/XMLSchema" xmlns:p="http://schemas.microsoft.com/office/2006/metadata/properties" xmlns:ns2="74098b8b-3ead-4c65-9f72-d36b5831b20e" xmlns:ns3="c25f9c22-fc1f-4454-8c46-2969b0535af5" targetNamespace="http://schemas.microsoft.com/office/2006/metadata/properties" ma:root="true" ma:fieldsID="77ed309eff22ef73c9fccc7a3e12d61f" ns2:_="" ns3:_="">
     <xsd:import namespace="74098b8b-3ead-4c65-9f72-d36b5831b20e"/>
@@ -6751,22 +6855,32 @@
 </ct:contentTypeSchema>
 </file>
 
-<file path=customXml/item2.xml><?xml version="1.0" encoding="utf-8"?>
-<?mso-contentType ?>
-<FormTemplates xmlns="http://schemas.microsoft.com/sharepoint/v3/contenttype/forms">
-  <Display>DocumentLibraryForm</Display>
-  <Edit>DocumentLibraryForm</Edit>
-  <New>DocumentLibraryForm</New>
-</FormTemplates>
+<file path=customXml/itemProps1.xml><?xml version="1.0" encoding="utf-8"?>
+<ds:datastoreItem xmlns:ds="http://schemas.openxmlformats.org/officeDocument/2006/customXml" ds:itemID="{89296970-E637-471F-86E2-950D4519AEC4}">
+  <ds:schemaRefs>
+    <ds:schemaRef ds:uri="http://schemas.microsoft.com/office/2006/documentManagement/types"/>
+    <ds:schemaRef ds:uri="http://purl.org/dc/terms/"/>
+    <ds:schemaRef ds:uri="http://schemas.microsoft.com/office/2006/metadata/properties"/>
+    <ds:schemaRef ds:uri="http://www.w3.org/XML/1998/namespace"/>
+    <ds:schemaRef ds:uri="http://purl.org/dc/dcmitype/"/>
+    <ds:schemaRef ds:uri="http://purl.org/dc/elements/1.1/"/>
+    <ds:schemaRef ds:uri="http://schemas.microsoft.com/office/infopath/2007/PartnerControls"/>
+    <ds:schemaRef ds:uri="http://schemas.openxmlformats.org/package/2006/metadata/core-properties"/>
+    <ds:schemaRef ds:uri="c25f9c22-fc1f-4454-8c46-2969b0535af5"/>
+    <ds:schemaRef ds:uri="74098b8b-3ead-4c65-9f72-d36b5831b20e"/>
+  </ds:schemaRefs>
+</ds:datastoreItem>
 </file>
 
-<file path=customXml/item3.xml><?xml version="1.0" encoding="utf-8"?>
-<p:properties xmlns:p="http://schemas.microsoft.com/office/2006/metadata/properties" xmlns:xsi="http://www.w3.org/2001/XMLSchema-instance" xmlns:pc="http://schemas.microsoft.com/office/infopath/2007/PartnerControls">
-  <documentManagement/>
-</p:properties>
+<file path=customXml/itemProps2.xml><?xml version="1.0" encoding="utf-8"?>
+<ds:datastoreItem xmlns:ds="http://schemas.openxmlformats.org/officeDocument/2006/customXml" ds:itemID="{D6CE178E-7963-4EFA-83EF-8E123369E092}">
+  <ds:schemaRefs>
+    <ds:schemaRef ds:uri="http://schemas.microsoft.com/sharepoint/v3/contenttype/forms"/>
+  </ds:schemaRefs>
+</ds:datastoreItem>
 </file>
 
-<file path=customXml/itemProps1.xml><?xml version="1.0" encoding="utf-8"?>
+<file path=customXml/itemProps3.xml><?xml version="1.0" encoding="utf-8"?>
 <ds:datastoreItem xmlns:ds="http://schemas.openxmlformats.org/officeDocument/2006/customXml" ds:itemID="{26056780-E2CD-484B-90C1-F30A19D8A5D9}">
   <ds:schemaRefs>
     <ds:schemaRef ds:uri="http://schemas.microsoft.com/office/2006/metadata/contentType"/>
@@ -6783,29 +6897,4 @@
     <ds:schemaRef ds:uri="http://schemas.microsoft.com/internal/obd"/>
   </ds:schemaRefs>
 </ds:datastoreItem>
-</file>
-
-<file path=customXml/itemProps2.xml><?xml version="1.0" encoding="utf-8"?>
-<ds:datastoreItem xmlns:ds="http://schemas.openxmlformats.org/officeDocument/2006/customXml" ds:itemID="{D6CE178E-7963-4EFA-83EF-8E123369E092}">
-  <ds:schemaRefs>
-    <ds:schemaRef ds:uri="http://schemas.microsoft.com/sharepoint/v3/contenttype/forms"/>
-  </ds:schemaRefs>
-</ds:datastoreItem>
-</file>
-
-<file path=customXml/itemProps3.xml><?xml version="1.0" encoding="utf-8"?>
-<ds:datastoreItem xmlns:ds="http://schemas.openxmlformats.org/officeDocument/2006/customXml" ds:itemID="{89296970-E637-471F-86E2-950D4519AEC4}">
-  <ds:schemaRefs>
-    <ds:schemaRef ds:uri="http://schemas.microsoft.com/office/2006/documentManagement/types"/>
-    <ds:schemaRef ds:uri="http://purl.org/dc/terms/"/>
-    <ds:schemaRef ds:uri="http://schemas.microsoft.com/office/2006/metadata/properties"/>
-    <ds:schemaRef ds:uri="http://www.w3.org/XML/1998/namespace"/>
-    <ds:schemaRef ds:uri="http://purl.org/dc/dcmitype/"/>
-    <ds:schemaRef ds:uri="http://purl.org/dc/elements/1.1/"/>
-    <ds:schemaRef ds:uri="http://schemas.microsoft.com/office/infopath/2007/PartnerControls"/>
-    <ds:schemaRef ds:uri="http://schemas.openxmlformats.org/package/2006/metadata/core-properties"/>
-    <ds:schemaRef ds:uri="c25f9c22-fc1f-4454-8c46-2969b0535af5"/>
-    <ds:schemaRef ds:uri="74098b8b-3ead-4c65-9f72-d36b5831b20e"/>
-  </ds:schemaRefs>
-</ds:datastoreItem>
 </file>
</xml_diff>